<commit_message>
new table / canreg slide / slight modif in text
+  Canreg slide (not at the end, but before the all bunch of data
quality age specific slide by site)
+  Subtitle with date of creation for slide (will be in local language)
(Octobre on my computer..)
+ all text “new cases” change to “cases” to be consistant
+  new table : bar chart per year
+ force Appendix first chapter (age specific graph)
</commit_message>
<xml_diff>
--- a/conf/tables/r/slide_template/canreg_template.pptx
+++ b/conf/tables/r/slide_template/canreg_template.pptx
@@ -189,7 +189,7 @@
           <a:p>
             <a:fld id="{A4AD94E8-677F-46BE-B971-4F17EE98DD08}" type="datetimeFigureOut">
               <a:rPr lang="en-US" smtClean="0"/>
-              <a:t>9/28/2017</a:t>
+              <a:t>10/11/2017</a:t>
             </a:fld>
             <a:endParaRPr lang="en-US"/>
           </a:p>
@@ -329,14 +329,14 @@
         </p:nvSpPr>
         <p:spPr>
           <a:xfrm>
-            <a:off x="1295400" y="3359798"/>
-            <a:ext cx="6400800" cy="1752600"/>
+            <a:off x="685800" y="5621072"/>
+            <a:ext cx="6400800" cy="700138"/>
           </a:xfrm>
         </p:spPr>
         <p:txBody>
           <a:bodyPr/>
           <a:lstStyle>
-            <a:lvl1pPr marL="0" indent="0" algn="ctr">
+            <a:lvl1pPr marL="0" indent="0" algn="l">
               <a:buNone/>
               <a:defRPr>
                 <a:solidFill>
@@ -1685,6 +1685,519 @@
 </p:sldLayout>
 </file>
 
+<file path=ppt/slideLayouts/slideLayout8.xml><?xml version="1.0" encoding="utf-8"?>
+<p:sldLayout xmlns:a="http://schemas.openxmlformats.org/drawingml/2006/main" xmlns:r="http://schemas.openxmlformats.org/officeDocument/2006/relationships" xmlns:p="http://schemas.openxmlformats.org/presentationml/2006/main" preserve="1" userDrawn="1">
+  <p:cSld name="Canreg_info">
+    <p:spTree>
+      <p:nvGrpSpPr>
+        <p:cNvPr id="1" name=""/>
+        <p:cNvGrpSpPr/>
+        <p:nvPr/>
+      </p:nvGrpSpPr>
+      <p:grpSpPr>
+        <a:xfrm>
+          <a:off x="0" y="0"/>
+          <a:ext cx="0" cy="0"/>
+          <a:chOff x="0" y="0"/>
+          <a:chExt cx="0" cy="0"/>
+        </a:xfrm>
+      </p:grpSpPr>
+      <p:pic>
+        <p:nvPicPr>
+          <p:cNvPr id="1026" name="Picture 2" descr="Logo"/>
+          <p:cNvPicPr>
+            <a:picLocks noChangeAspect="1" noChangeArrowheads="1"/>
+          </p:cNvPicPr>
+          <p:nvPr userDrawn="1"/>
+        </p:nvPicPr>
+        <p:blipFill>
+          <a:blip r:embed="rId2">
+            <a:extLst>
+              <a:ext uri="{28A0092B-C50C-407E-A947-70E740481C1C}">
+                <a14:useLocalDpi xmlns:a14="http://schemas.microsoft.com/office/drawing/2010/main" val="0"/>
+              </a:ext>
+            </a:extLst>
+          </a:blip>
+          <a:srcRect/>
+          <a:stretch>
+            <a:fillRect/>
+          </a:stretch>
+        </p:blipFill>
+        <p:spPr bwMode="auto">
+          <a:xfrm>
+            <a:off x="5866365" y="3210366"/>
+            <a:ext cx="2614205" cy="2520000"/>
+          </a:xfrm>
+          <a:prstGeom prst="rect">
+            <a:avLst/>
+          </a:prstGeom>
+          <a:noFill/>
+          <a:extLst>
+            <a:ext uri="{909E8E84-426E-40DD-AFC4-6F175D3DCCD1}">
+              <a14:hiddenFill xmlns:a14="http://schemas.microsoft.com/office/drawing/2010/main">
+                <a:solidFill>
+                  <a:srgbClr val="FFFFFF"/>
+                </a:solidFill>
+              </a14:hiddenFill>
+            </a:ext>
+          </a:extLst>
+        </p:spPr>
+      </p:pic>
+      <p:sp>
+        <p:nvSpPr>
+          <p:cNvPr id="5" name="Rectangle 4"/>
+          <p:cNvSpPr/>
+          <p:nvPr userDrawn="1"/>
+        </p:nvSpPr>
+        <p:spPr>
+          <a:xfrm>
+            <a:off x="301752" y="2069709"/>
+            <a:ext cx="5074920" cy="4801314"/>
+          </a:xfrm>
+          <a:prstGeom prst="rect">
+            <a:avLst/>
+          </a:prstGeom>
+        </p:spPr>
+        <p:txBody>
+          <a:bodyPr wrap="square">
+            <a:spAutoFit/>
+          </a:bodyPr>
+          <a:lstStyle/>
+          <a:p>
+            <a:pPr marL="285750" marR="0" indent="-285750" algn="l" defTabSz="914400" rtl="0" eaLnBrk="1" fontAlgn="auto" latinLnBrk="0" hangingPunct="1">
+              <a:lnSpc>
+                <a:spcPct val="100000"/>
+              </a:lnSpc>
+              <a:spcBef>
+                <a:spcPts val="0"/>
+              </a:spcBef>
+              <a:spcAft>
+                <a:spcPts val="0"/>
+              </a:spcAft>
+              <a:buClrTx/>
+              <a:buSzTx/>
+              <a:buFont typeface="Wingdings" panose="05000000000000000000" pitchFamily="2" charset="2"/>
+              <a:buChar char="Ø"/>
+              <a:tabLst/>
+              <a:defRPr/>
+            </a:pPr>
+            <a:r>
+              <a:rPr lang="en-GB" sz="1800" b="0" i="0" kern="1200" dirty="0" smtClean="0">
+                <a:solidFill>
+                  <a:schemeClr val="tx1"/>
+                </a:solidFill>
+                <a:effectLst/>
+                <a:latin typeface="+mn-lt"/>
+                <a:ea typeface="+mn-ea"/>
+                <a:cs typeface="+mn-cs"/>
+              </a:rPr>
+              <a:t>Open source tool.</a:t>
+            </a:r>
+          </a:p>
+          <a:p>
+            <a:pPr marL="285750" marR="0" indent="-285750" algn="l" defTabSz="914400" rtl="0" eaLnBrk="1" fontAlgn="auto" latinLnBrk="0" hangingPunct="1">
+              <a:lnSpc>
+                <a:spcPct val="100000"/>
+              </a:lnSpc>
+              <a:spcBef>
+                <a:spcPts val="0"/>
+              </a:spcBef>
+              <a:spcAft>
+                <a:spcPts val="0"/>
+              </a:spcAft>
+              <a:buClrTx/>
+              <a:buSzTx/>
+              <a:buFont typeface="Wingdings" panose="05000000000000000000" pitchFamily="2" charset="2"/>
+              <a:buChar char="Ø"/>
+              <a:tabLst/>
+              <a:defRPr/>
+            </a:pPr>
+            <a:endParaRPr lang="en-GB" sz="1800" b="0" i="0" kern="1200" dirty="0" smtClean="0">
+              <a:solidFill>
+                <a:schemeClr val="tx1"/>
+              </a:solidFill>
+              <a:effectLst/>
+              <a:latin typeface="+mn-lt"/>
+              <a:ea typeface="+mn-ea"/>
+              <a:cs typeface="+mn-cs"/>
+            </a:endParaRPr>
+          </a:p>
+          <a:p>
+            <a:pPr marL="285750" indent="-285750">
+              <a:buFont typeface="Wingdings" panose="05000000000000000000" pitchFamily="2" charset="2"/>
+              <a:buChar char="Ø"/>
+            </a:pPr>
+            <a:r>
+              <a:rPr lang="en-GB" sz="1800" b="0" i="0" kern="1200" dirty="0" smtClean="0">
+                <a:solidFill>
+                  <a:schemeClr val="tx1"/>
+                </a:solidFill>
+                <a:effectLst/>
+                <a:latin typeface="+mn-lt"/>
+                <a:ea typeface="+mn-ea"/>
+                <a:cs typeface="+mn-cs"/>
+              </a:rPr>
+              <a:t>Input, store, check and analyse cancer registry data.</a:t>
+            </a:r>
+          </a:p>
+          <a:p>
+            <a:pPr marL="285750" indent="-285750">
+              <a:buFont typeface="Wingdings" panose="05000000000000000000" pitchFamily="2" charset="2"/>
+              <a:buChar char="Ø"/>
+            </a:pPr>
+            <a:endParaRPr lang="en-GB" sz="1800" b="0" i="0" kern="1200" dirty="0" smtClean="0">
+              <a:solidFill>
+                <a:schemeClr val="tx1"/>
+              </a:solidFill>
+              <a:effectLst/>
+              <a:latin typeface="+mn-lt"/>
+              <a:ea typeface="+mn-ea"/>
+              <a:cs typeface="+mn-cs"/>
+            </a:endParaRPr>
+          </a:p>
+          <a:p>
+            <a:pPr marL="285750" indent="-285750">
+              <a:buFont typeface="Wingdings" panose="05000000000000000000" pitchFamily="2" charset="2"/>
+              <a:buChar char="Ø"/>
+            </a:pPr>
+            <a:r>
+              <a:rPr lang="en-GB" sz="1800" b="0" i="0" kern="1200" dirty="0" smtClean="0">
+                <a:solidFill>
+                  <a:schemeClr val="tx1"/>
+                </a:solidFill>
+                <a:effectLst/>
+                <a:latin typeface="+mn-lt"/>
+                <a:ea typeface="+mn-ea"/>
+                <a:cs typeface="+mn-cs"/>
+              </a:rPr>
+              <a:t>Modules to do data entry, quality control, consistency checks and basic analysis of the data.</a:t>
+            </a:r>
+          </a:p>
+          <a:p>
+            <a:pPr marL="0" indent="0">
+              <a:buFont typeface="Wingdings" panose="05000000000000000000" pitchFamily="2" charset="2"/>
+              <a:buNone/>
+            </a:pPr>
+            <a:endParaRPr lang="en-GB" sz="1800" b="0" i="0" kern="1200" dirty="0" smtClean="0">
+              <a:solidFill>
+                <a:schemeClr val="tx1"/>
+              </a:solidFill>
+              <a:effectLst/>
+              <a:latin typeface="+mn-lt"/>
+              <a:ea typeface="+mn-ea"/>
+              <a:cs typeface="+mn-cs"/>
+            </a:endParaRPr>
+          </a:p>
+          <a:p>
+            <a:pPr marL="285750" indent="-285750">
+              <a:buFont typeface="Wingdings" panose="05000000000000000000" pitchFamily="2" charset="2"/>
+              <a:buChar char="Ø"/>
+            </a:pPr>
+            <a:r>
+              <a:rPr lang="en-GB" sz="1800" b="0" i="0" kern="1200" dirty="0" smtClean="0">
+                <a:solidFill>
+                  <a:schemeClr val="tx1"/>
+                </a:solidFill>
+                <a:effectLst/>
+                <a:latin typeface="+mn-lt"/>
+                <a:ea typeface="+mn-ea"/>
+                <a:cs typeface="+mn-cs"/>
+              </a:rPr>
+              <a:t>Generate</a:t>
+            </a:r>
+            <a:r>
+              <a:rPr lang="en-GB" sz="1800" b="0" i="0" kern="1200" baseline="0" dirty="0" smtClean="0">
+                <a:solidFill>
+                  <a:schemeClr val="tx1"/>
+                </a:solidFill>
+                <a:effectLst/>
+                <a:latin typeface="+mn-lt"/>
+                <a:ea typeface="+mn-ea"/>
+                <a:cs typeface="+mn-cs"/>
+              </a:rPr>
+              <a:t> high quality graphics, report and presentation.</a:t>
+            </a:r>
+          </a:p>
+          <a:p>
+            <a:pPr marL="285750" indent="-285750">
+              <a:buFont typeface="Wingdings" panose="05000000000000000000" pitchFamily="2" charset="2"/>
+              <a:buChar char="Ø"/>
+            </a:pPr>
+            <a:endParaRPr lang="en-GB" sz="1800" b="0" i="0" kern="1200" baseline="0" dirty="0" smtClean="0">
+              <a:solidFill>
+                <a:schemeClr val="tx1"/>
+              </a:solidFill>
+              <a:effectLst/>
+              <a:latin typeface="+mn-lt"/>
+              <a:ea typeface="+mn-ea"/>
+              <a:cs typeface="+mn-cs"/>
+            </a:endParaRPr>
+          </a:p>
+          <a:p>
+            <a:pPr marL="285750" indent="-285750">
+              <a:buFont typeface="Wingdings" panose="05000000000000000000" pitchFamily="2" charset="2"/>
+              <a:buChar char="Ø"/>
+            </a:pPr>
+            <a:r>
+              <a:rPr lang="en-GB" sz="1800" b="0" i="0" kern="1200" baseline="0" dirty="0" smtClean="0">
+                <a:solidFill>
+                  <a:schemeClr val="tx1"/>
+                </a:solidFill>
+                <a:effectLst/>
+                <a:latin typeface="+mn-lt"/>
+                <a:ea typeface="+mn-ea"/>
+                <a:cs typeface="+mn-cs"/>
+              </a:rPr>
+              <a:t>Multi user capacities.</a:t>
+            </a:r>
+          </a:p>
+          <a:p>
+            <a:pPr marL="285750" indent="-285750">
+              <a:buFont typeface="Wingdings" panose="05000000000000000000" pitchFamily="2" charset="2"/>
+              <a:buChar char="Ø"/>
+            </a:pPr>
+            <a:endParaRPr lang="en-GB" sz="1800" b="0" i="0" kern="1200" baseline="0" dirty="0" smtClean="0">
+              <a:solidFill>
+                <a:schemeClr val="tx1"/>
+              </a:solidFill>
+              <a:effectLst/>
+              <a:latin typeface="+mn-lt"/>
+              <a:ea typeface="+mn-ea"/>
+              <a:cs typeface="+mn-cs"/>
+            </a:endParaRPr>
+          </a:p>
+          <a:p>
+            <a:pPr marL="285750" indent="-285750">
+              <a:buFont typeface="Wingdings" panose="05000000000000000000" pitchFamily="2" charset="2"/>
+              <a:buChar char="Ø"/>
+            </a:pPr>
+            <a:r>
+              <a:rPr lang="en-GB" sz="1800" b="0" i="0" kern="1200" baseline="0" dirty="0" smtClean="0">
+                <a:solidFill>
+                  <a:schemeClr val="tx1"/>
+                </a:solidFill>
+                <a:effectLst/>
+                <a:latin typeface="+mn-lt"/>
+                <a:ea typeface="+mn-ea"/>
+                <a:cs typeface="+mn-cs"/>
+              </a:rPr>
+              <a:t>Tool to </a:t>
+            </a:r>
+            <a:r>
+              <a:rPr lang="en-GB" sz="1800" b="0" i="0" kern="1200" dirty="0" smtClean="0">
+                <a:solidFill>
+                  <a:schemeClr val="tx1"/>
+                </a:solidFill>
+                <a:effectLst/>
+                <a:latin typeface="+mn-lt"/>
+                <a:ea typeface="+mn-ea"/>
+                <a:cs typeface="+mn-cs"/>
+              </a:rPr>
+              <a:t>facilitate the set up of a new or modification of an existing database by adding new variables, tailoring the data entry forms etc.</a:t>
+            </a:r>
+            <a:r>
+              <a:rPr lang="en-GB" sz="1800" b="0" i="0" kern="1200" baseline="0" dirty="0" smtClean="0">
+                <a:solidFill>
+                  <a:schemeClr val="tx1"/>
+                </a:solidFill>
+                <a:effectLst/>
+                <a:latin typeface="+mn-lt"/>
+                <a:ea typeface="+mn-ea"/>
+                <a:cs typeface="+mn-cs"/>
+              </a:rPr>
+              <a:t>  </a:t>
+            </a:r>
+            <a:endParaRPr lang="en-GB" sz="1800" b="0" i="0" kern="1200" dirty="0" smtClean="0">
+              <a:solidFill>
+                <a:schemeClr val="tx1"/>
+              </a:solidFill>
+              <a:effectLst/>
+              <a:latin typeface="+mn-lt"/>
+              <a:ea typeface="+mn-ea"/>
+              <a:cs typeface="+mn-cs"/>
+            </a:endParaRPr>
+          </a:p>
+          <a:p>
+            <a:endParaRPr lang="en-GB" sz="1800" b="0" i="0" kern="1200" dirty="0" smtClean="0">
+              <a:solidFill>
+                <a:schemeClr val="tx1"/>
+              </a:solidFill>
+              <a:effectLst/>
+              <a:latin typeface="+mn-lt"/>
+              <a:ea typeface="+mn-ea"/>
+              <a:cs typeface="+mn-cs"/>
+            </a:endParaRPr>
+          </a:p>
+        </p:txBody>
+      </p:sp>
+      <p:sp>
+        <p:nvSpPr>
+          <p:cNvPr id="12" name="Rectangle 11"/>
+          <p:cNvSpPr/>
+          <p:nvPr userDrawn="1"/>
+        </p:nvSpPr>
+        <p:spPr>
+          <a:xfrm>
+            <a:off x="5504687" y="2069709"/>
+            <a:ext cx="3337561" cy="369332"/>
+          </a:xfrm>
+          <a:prstGeom prst="rect">
+            <a:avLst/>
+          </a:prstGeom>
+        </p:spPr>
+        <p:txBody>
+          <a:bodyPr wrap="square">
+            <a:spAutoFit/>
+          </a:bodyPr>
+          <a:lstStyle/>
+          <a:p>
+            <a:pPr marL="0" marR="0" indent="0" algn="l" defTabSz="914400" rtl="0" eaLnBrk="1" fontAlgn="auto" latinLnBrk="0" hangingPunct="1">
+              <a:lnSpc>
+                <a:spcPct val="100000"/>
+              </a:lnSpc>
+              <a:spcBef>
+                <a:spcPts val="0"/>
+              </a:spcBef>
+              <a:spcAft>
+                <a:spcPts val="0"/>
+              </a:spcAft>
+              <a:buClrTx/>
+              <a:buSzTx/>
+              <a:buFont typeface="Arial" panose="020B0604020202020204" pitchFamily="34" charset="0"/>
+              <a:buNone/>
+              <a:tabLst/>
+              <a:defRPr/>
+            </a:pPr>
+            <a:r>
+              <a:rPr lang="en-US" dirty="0" smtClean="0"/>
+              <a:t>http://www.iacr.com.fr/CanReg5</a:t>
+            </a:r>
+            <a:endParaRPr lang="en-GB" sz="1800" b="0" i="0" kern="1200" dirty="0" smtClean="0">
+              <a:solidFill>
+                <a:schemeClr val="tx1"/>
+              </a:solidFill>
+              <a:effectLst/>
+              <a:latin typeface="+mn-lt"/>
+              <a:ea typeface="+mn-ea"/>
+              <a:cs typeface="+mn-cs"/>
+            </a:endParaRPr>
+          </a:p>
+        </p:txBody>
+      </p:sp>
+      <p:sp>
+        <p:nvSpPr>
+          <p:cNvPr id="13" name="Rectangle 12"/>
+          <p:cNvSpPr/>
+          <p:nvPr userDrawn="1"/>
+        </p:nvSpPr>
+        <p:spPr>
+          <a:xfrm>
+            <a:off x="301753" y="211143"/>
+            <a:ext cx="8540496" cy="630942"/>
+          </a:xfrm>
+          <a:prstGeom prst="rect">
+            <a:avLst/>
+          </a:prstGeom>
+        </p:spPr>
+        <p:txBody>
+          <a:bodyPr wrap="square">
+            <a:spAutoFit/>
+          </a:bodyPr>
+          <a:lstStyle/>
+          <a:p>
+            <a:pPr marL="0" marR="0" indent="0" algn="ctr" defTabSz="914400" rtl="0" eaLnBrk="1" fontAlgn="auto" latinLnBrk="0" hangingPunct="1">
+              <a:lnSpc>
+                <a:spcPct val="100000"/>
+              </a:lnSpc>
+              <a:spcBef>
+                <a:spcPts val="0"/>
+              </a:spcBef>
+              <a:spcAft>
+                <a:spcPts val="0"/>
+              </a:spcAft>
+              <a:buClrTx/>
+              <a:buSzTx/>
+              <a:buFont typeface="Arial" panose="020B0604020202020204" pitchFamily="34" charset="0"/>
+              <a:buNone/>
+              <a:tabLst/>
+              <a:defRPr/>
+            </a:pPr>
+            <a:r>
+              <a:rPr lang="en-US" sz="3500" dirty="0" smtClean="0"/>
+              <a:t>CanReg</a:t>
+            </a:r>
+            <a:r>
+              <a:rPr lang="en-US" sz="3500" baseline="0" dirty="0" smtClean="0"/>
+              <a:t>5 software</a:t>
+            </a:r>
+            <a:endParaRPr lang="en-GB" sz="3500" b="0" i="0" kern="1200" dirty="0" smtClean="0">
+              <a:solidFill>
+                <a:schemeClr val="tx1"/>
+              </a:solidFill>
+              <a:effectLst/>
+              <a:latin typeface="+mn-lt"/>
+              <a:ea typeface="+mn-ea"/>
+              <a:cs typeface="+mn-cs"/>
+            </a:endParaRPr>
+          </a:p>
+        </p:txBody>
+      </p:sp>
+      <p:sp>
+        <p:nvSpPr>
+          <p:cNvPr id="14" name="Rectangle 13"/>
+          <p:cNvSpPr/>
+          <p:nvPr userDrawn="1"/>
+        </p:nvSpPr>
+        <p:spPr>
+          <a:xfrm>
+            <a:off x="301753" y="971637"/>
+            <a:ext cx="8540496" cy="729147"/>
+          </a:xfrm>
+          <a:prstGeom prst="rect">
+            <a:avLst/>
+          </a:prstGeom>
+        </p:spPr>
+        <p:txBody>
+          <a:bodyPr vert="horz" lIns="91440" tIns="45720" rIns="91440" bIns="45720" rtlCol="0" anchor="b">
+            <a:normAutofit/>
+          </a:bodyPr>
+          <a:lstStyle/>
+          <a:p>
+            <a:pPr lvl="0" indent="0" algn="ctr">
+              <a:spcBef>
+                <a:spcPct val="20000"/>
+              </a:spcBef>
+              <a:buFont typeface="Arial" panose="020B0604020202020204" pitchFamily="34" charset="0"/>
+              <a:buNone/>
+            </a:pPr>
+            <a:r>
+              <a:rPr lang="en-GB" sz="2000" b="0" dirty="0" smtClean="0"/>
+              <a:t>This presentation was generated by CanReg5 software.</a:t>
+            </a:r>
+            <a:br>
+              <a:rPr lang="en-GB" sz="2000" b="0" dirty="0" smtClean="0"/>
+            </a:br>
+            <a:r>
+              <a:rPr lang="en-GB" sz="2000" b="0" dirty="0" smtClean="0"/>
+              <a:t>Cancer cases were registered using the CanReg5 software.</a:t>
+            </a:r>
+            <a:endParaRPr lang="en-US" sz="2000" b="0" dirty="0"/>
+          </a:p>
+        </p:txBody>
+      </p:sp>
+    </p:spTree>
+    <p:extLst>
+      <p:ext uri="{BB962C8B-B14F-4D97-AF65-F5344CB8AC3E}">
+        <p14:creationId xmlns:p14="http://schemas.microsoft.com/office/powerpoint/2010/main" val="282928886"/>
+      </p:ext>
+    </p:extLst>
+  </p:cSld>
+  <p:clrMapOvr>
+    <a:masterClrMapping/>
+  </p:clrMapOvr>
+</p:sldLayout>
+</file>
+
 <file path=ppt/slideMasters/slideMaster1.xml><?xml version="1.0" encoding="utf-8"?>
 <p:sldMaster xmlns:a="http://schemas.openxmlformats.org/drawingml/2006/main" xmlns:r="http://schemas.openxmlformats.org/officeDocument/2006/relationships" xmlns:p="http://schemas.openxmlformats.org/presentationml/2006/main">
   <p:cSld>
@@ -1818,7 +2331,7 @@
           <p:nvPr userDrawn="1"/>
         </p:nvPicPr>
         <p:blipFill>
-          <a:blip r:embed="rId9" cstate="print">
+          <a:blip r:embed="rId10" cstate="print">
             <a:extLst>
               <a:ext uri="{28A0092B-C50C-407E-A947-70E740481C1C}">
                 <a14:useLocalDpi xmlns:a14="http://schemas.microsoft.com/office/drawing/2010/main" val="0"/>
@@ -1855,6 +2368,7 @@
     <p:sldLayoutId id="2147483653" r:id="rId5"/>
     <p:sldLayoutId id="2147483662" r:id="rId6"/>
     <p:sldLayoutId id="2147483661" r:id="rId7"/>
+    <p:sldLayoutId id="2147483665" r:id="rId8"/>
   </p:sldLayoutIdLst>
   <p:txStyles>
     <p:titleStyle>

</xml_diff>